<commit_message>
Updated files with latest changes
</commit_message>
<xml_diff>
--- a/Group14G...pptx
+++ b/Group14G...pptx
@@ -3691,7 +3691,7 @@
               </a14:hiddenFill>
             </a:ext>
             <a:ext uri="{FAA26D3D-D897-4be2-8F04-BA451C77F1D7}">
-              <ma14:placeholderFlag xmlns:ma14="http://schemas.microsoft.com/office/mac/drawingml/2011/main" xmlns="" val="1"/>
+              <ma14:placeholderFlag xmlns="" xmlns:ma14="http://schemas.microsoft.com/office/mac/drawingml/2011/main" val="1"/>
             </a:ext>
           </a:extLst>
         </p:spPr>
@@ -3868,7 +3868,7 @@
               <a:pPr>
                 <a:defRPr/>
               </a:pPr>
-              <a:t>‹#›</a:t>
+              <a:t>‹N°›</a:t>
             </a:fld>
             <a:endParaRPr lang="en-US"/>
           </a:p>
@@ -4375,14 +4375,14 @@
           </a:ln>
           <a:extLst>
             <a:ext uri="{909E8E84-426E-40dd-AFC4-6F175D3DCCD1}">
-              <a14:hiddenFill xmlns:a14="http://schemas.microsoft.com/office/drawing/2010/main" xmlns="">
+              <a14:hiddenFill xmlns="" xmlns:a14="http://schemas.microsoft.com/office/drawing/2010/main">
                 <a:solidFill>
                   <a:srgbClr val="FFFFFF"/>
                 </a:solidFill>
               </a14:hiddenFill>
             </a:ext>
             <a:ext uri="{91240B29-F687-4f45-9708-019B960494DF}">
-              <a14:hiddenLine xmlns:a14="http://schemas.microsoft.com/office/drawing/2010/main" xmlns="" w="9525">
+              <a14:hiddenLine xmlns="" xmlns:a14="http://schemas.microsoft.com/office/drawing/2010/main" w="9525">
                 <a:solidFill>
                   <a:srgbClr val="000000"/>
                 </a:solidFill>
@@ -4392,7 +4392,7 @@
               </a14:hiddenLine>
             </a:ext>
             <a:ext uri="{FAA26D3D-D897-4be2-8F04-BA451C77F1D7}">
-              <ma14:placeholderFlag xmlns:ma14="http://schemas.microsoft.com/office/mac/drawingml/2011/main" xmlns="" val="1"/>
+              <ma14:placeholderFlag xmlns="" xmlns:ma14="http://schemas.microsoft.com/office/mac/drawingml/2011/main" val="1"/>
             </a:ext>
           </a:extLst>
         </p:spPr>
@@ -4436,14 +4436,14 @@
           </a:ln>
           <a:extLst>
             <a:ext uri="{909E8E84-426E-40dd-AFC4-6F175D3DCCD1}">
-              <a14:hiddenFill xmlns:a14="http://schemas.microsoft.com/office/drawing/2010/main" xmlns="">
+              <a14:hiddenFill xmlns="" xmlns:a14="http://schemas.microsoft.com/office/drawing/2010/main">
                 <a:solidFill>
                   <a:srgbClr val="FFFFFF"/>
                 </a:solidFill>
               </a14:hiddenFill>
             </a:ext>
             <a:ext uri="{91240B29-F687-4f45-9708-019B960494DF}">
-              <a14:hiddenLine xmlns:a14="http://schemas.microsoft.com/office/drawing/2010/main" xmlns="" w="9525">
+              <a14:hiddenLine xmlns="" xmlns:a14="http://schemas.microsoft.com/office/drawing/2010/main" w="9525">
                 <a:solidFill>
                   <a:srgbClr val="000000"/>
                 </a:solidFill>
@@ -4453,7 +4453,7 @@
               </a14:hiddenLine>
             </a:ext>
             <a:ext uri="{FAA26D3D-D897-4be2-8F04-BA451C77F1D7}">
-              <ma14:placeholderFlag xmlns:ma14="http://schemas.microsoft.com/office/mac/drawingml/2011/main" xmlns="" val="1"/>
+              <ma14:placeholderFlag xmlns="" xmlns:ma14="http://schemas.microsoft.com/office/mac/drawingml/2011/main" val="1"/>
             </a:ext>
           </a:extLst>
         </p:spPr>
@@ -5605,7 +5605,7 @@
         </p:blipFill>
         <p:spPr>
           <a:xfrm>
-            <a:off x="4956048" y="5221224"/>
+            <a:off x="4956048" y="4817241"/>
             <a:ext cx="4187952" cy="393542"/>
           </a:xfrm>
           <a:prstGeom prst="rect">
@@ -5613,6 +5613,155 @@
           </a:prstGeom>
         </p:spPr>
       </p:pic>
+      <p:sp>
+        <p:nvSpPr>
+          <p:cNvPr id="4" name="ZoneTexte 3">
+            <a:extLst>
+              <a:ext uri="{FF2B5EF4-FFF2-40B4-BE49-F238E27FC236}">
+                <a16:creationId xmlns:a16="http://schemas.microsoft.com/office/drawing/2014/main" id="{E546449D-75CA-CA7C-1D60-F945BB527F25}"/>
+              </a:ext>
+            </a:extLst>
+          </p:cNvPr>
+          <p:cNvSpPr txBox="1"/>
+          <p:nvPr/>
+        </p:nvSpPr>
+        <p:spPr>
+          <a:xfrm>
+            <a:off x="5587078" y="6060917"/>
+            <a:ext cx="2477930" cy="738664"/>
+          </a:xfrm>
+          <a:prstGeom prst="rect">
+            <a:avLst/>
+          </a:prstGeom>
+          <a:noFill/>
+        </p:spPr>
+        <p:txBody>
+          <a:bodyPr wrap="square">
+            <a:spAutoFit/>
+          </a:bodyPr>
+          <a:lstStyle/>
+          <a:p>
+            <a:r>
+              <a:rPr lang="fr-CA" sz="1400" dirty="0">
+                <a:hlinkClick r:id="rId6"/>
+              </a:rPr>
+              <a:t>https://github.com/prbis/Project-6313-Cloud.git</a:t>
+            </a:r>
+            <a:endParaRPr lang="fr-CA" sz="1400" dirty="0"/>
+          </a:p>
+          <a:p>
+            <a:endParaRPr lang="fr-CA" sz="1400" dirty="0"/>
+          </a:p>
+        </p:txBody>
+      </p:sp>
+      <p:sp>
+        <p:nvSpPr>
+          <p:cNvPr id="5" name="ZoneTexte 4">
+            <a:extLst>
+              <a:ext uri="{FF2B5EF4-FFF2-40B4-BE49-F238E27FC236}">
+                <a16:creationId xmlns:a16="http://schemas.microsoft.com/office/drawing/2014/main" id="{191CD65F-B1CC-88C7-15A1-E54CE13735DE}"/>
+              </a:ext>
+            </a:extLst>
+          </p:cNvPr>
+          <p:cNvSpPr txBox="1"/>
+          <p:nvPr/>
+        </p:nvSpPr>
+        <p:spPr>
+          <a:xfrm>
+            <a:off x="5517503" y="5572725"/>
+            <a:ext cx="2195261" cy="369332"/>
+          </a:xfrm>
+          <a:prstGeom prst="rect">
+            <a:avLst/>
+          </a:prstGeom>
+          <a:noFill/>
+        </p:spPr>
+        <p:txBody>
+          <a:bodyPr wrap="square" rtlCol="0">
+            <a:spAutoFit/>
+          </a:bodyPr>
+          <a:lstStyle/>
+          <a:p>
+            <a:r>
+              <a:rPr lang="fr-CA" sz="1800" dirty="0" err="1"/>
+              <a:t>Github</a:t>
+            </a:r>
+            <a:r>
+              <a:rPr lang="fr-CA" sz="1800" dirty="0"/>
+              <a:t> Link:</a:t>
+            </a:r>
+          </a:p>
+        </p:txBody>
+      </p:sp>
+      <p:sp>
+        <p:nvSpPr>
+          <p:cNvPr id="6" name="Rectangle 5">
+            <a:extLst>
+              <a:ext uri="{FF2B5EF4-FFF2-40B4-BE49-F238E27FC236}">
+                <a16:creationId xmlns:a16="http://schemas.microsoft.com/office/drawing/2014/main" id="{CE986764-277E-D1EE-3FB7-F4109BC2C4A0}"/>
+              </a:ext>
+            </a:extLst>
+          </p:cNvPr>
+          <p:cNvSpPr/>
+          <p:nvPr/>
+        </p:nvSpPr>
+        <p:spPr bwMode="auto">
+          <a:xfrm>
+            <a:off x="5511891" y="5606881"/>
+            <a:ext cx="2628304" cy="1079027"/>
+          </a:xfrm>
+          <a:prstGeom prst="rect">
+            <a:avLst/>
+          </a:prstGeom>
+          <a:noFill/>
+          <a:ln w="9525" cap="flat" cmpd="sng" algn="ctr">
+            <a:solidFill>
+              <a:schemeClr val="bg2"/>
+            </a:solidFill>
+            <a:prstDash val="solid"/>
+            <a:round/>
+            <a:headEnd type="none" w="med" len="med"/>
+            <a:tailEnd type="none" w="med" len="med"/>
+          </a:ln>
+          <a:effectLst/>
+        </p:spPr>
+        <p:txBody>
+          <a:bodyPr vert="horz" wrap="square" lIns="91440" tIns="45720" rIns="91440" bIns="45720" numCol="1" rtlCol="0" anchor="t" anchorCtr="0" compatLnSpc="1">
+            <a:prstTxWarp prst="textNoShape">
+              <a:avLst/>
+            </a:prstTxWarp>
+          </a:bodyPr>
+          <a:lstStyle/>
+          <a:p>
+            <a:pPr marL="0" marR="0" indent="0" algn="l" defTabSz="914400" rtl="0" eaLnBrk="0" fontAlgn="base" latinLnBrk="0" hangingPunct="0">
+              <a:lnSpc>
+                <a:spcPct val="100000"/>
+              </a:lnSpc>
+              <a:spcBef>
+                <a:spcPct val="0"/>
+              </a:spcBef>
+              <a:spcAft>
+                <a:spcPct val="0"/>
+              </a:spcAft>
+              <a:buClrTx/>
+              <a:buSzTx/>
+              <a:buFontTx/>
+              <a:buNone/>
+              <a:tabLst/>
+            </a:pPr>
+            <a:endParaRPr kumimoji="0" lang="fr-CA" sz="2400" b="0" i="0" u="none" strike="noStrike" cap="none" normalizeH="0" baseline="0">
+              <a:ln>
+                <a:noFill/>
+              </a:ln>
+              <a:solidFill>
+                <a:schemeClr val="tx1"/>
+              </a:solidFill>
+              <a:effectLst/>
+              <a:latin typeface="Times" pitchFamily="-32" charset="0"/>
+            </a:endParaRPr>
+          </a:p>
+        </p:txBody>
+      </p:sp>
     </p:spTree>
     <p:extLst>
       <p:ext uri="{BB962C8B-B14F-4D97-AF65-F5344CB8AC3E}">
@@ -7118,7 +7267,7 @@
               </a14:hiddenLine>
             </a:ext>
             <a:ext uri="{FAA26D3D-D897-4be2-8F04-BA451C77F1D7}">
-              <ma14:placeholderFlag xmlns:ma14="http://schemas.microsoft.com/office/mac/drawingml/2011/main" xmlns="" val="1"/>
+              <ma14:placeholderFlag xmlns="" xmlns:ma14="http://schemas.microsoft.com/office/mac/drawingml/2011/main" val="1"/>
             </a:ext>
           </a:extLst>
         </p:spPr>
@@ -8529,7 +8678,7 @@
               </a14:hiddenLine>
             </a:ext>
             <a:ext uri="{FAA26D3D-D897-4be2-8F04-BA451C77F1D7}">
-              <ma14:placeholderFlag xmlns:ma14="http://schemas.microsoft.com/office/mac/drawingml/2011/main" xmlns="" val="1"/>
+              <ma14:placeholderFlag xmlns="" xmlns:ma14="http://schemas.microsoft.com/office/mac/drawingml/2011/main" val="1"/>
             </a:ext>
           </a:extLst>
         </p:spPr>
@@ -8882,7 +9031,7 @@
               </a14:hiddenLine>
             </a:ext>
             <a:ext uri="{FAA26D3D-D897-4be2-8F04-BA451C77F1D7}">
-              <ma14:placeholderFlag xmlns:ma14="http://schemas.microsoft.com/office/mac/drawingml/2011/main" xmlns="" val="1"/>
+              <ma14:placeholderFlag xmlns="" xmlns:ma14="http://schemas.microsoft.com/office/mac/drawingml/2011/main" val="1"/>
             </a:ext>
           </a:extLst>
         </p:spPr>
@@ -10756,21 +10905,6 @@
 </file>
 
 <file path=customXml/item1.xml><?xml version="1.0" encoding="utf-8"?>
-<?mso-contentType ?>
-<FormTemplates xmlns="http://schemas.microsoft.com/sharepoint/v3/contenttype/forms">
-  <Display>DocumentLibraryForm</Display>
-  <Edit>DocumentLibraryForm</Edit>
-  <New>DocumentLibraryForm</New>
-</FormTemplates>
-</file>
-
-<file path=customXml/item2.xml><?xml version="1.0" encoding="utf-8"?>
-<p:properties xmlns:p="http://schemas.microsoft.com/office/2006/metadata/properties" xmlns:xsi="http://www.w3.org/2001/XMLSchema-instance" xmlns:pc="http://schemas.microsoft.com/office/infopath/2007/PartnerControls">
-  <documentManagement/>
-</p:properties>
-</file>
-
-<file path=customXml/item3.xml><?xml version="1.0" encoding="utf-8"?>
 <ct:contentTypeSchema xmlns:ct="http://schemas.microsoft.com/office/2006/metadata/contentType" xmlns:ma="http://schemas.microsoft.com/office/2006/metadata/properties/metaAttributes" ct:_="" ma:_="" ma:contentTypeName="Document" ma:contentTypeID="0x0101007C062B8896626B4C8C79D0463E2B1754" ma:contentTypeVersion="2" ma:contentTypeDescription="Create a new document." ma:contentTypeScope="" ma:versionID="3a368f194953be4028da428deffc7162">
   <xsd:schema xmlns:xsd="http://www.w3.org/2001/XMLSchema" xmlns:xs="http://www.w3.org/2001/XMLSchema" xmlns:p="http://schemas.microsoft.com/office/2006/metadata/properties" xmlns:ns2="23ba0ab6-0247-450b-9319-52df7f9e0b72" targetNamespace="http://schemas.microsoft.com/office/2006/metadata/properties" ma:root="true" ma:fieldsID="5781a80f8622e71678f3a702757e502b" ns2:_="">
     <xsd:import namespace="23ba0ab6-0247-450b-9319-52df7f9e0b72"/>
@@ -10902,10 +11036,35 @@
 </ct:contentTypeSchema>
 </file>
 
+<file path=customXml/item2.xml><?xml version="1.0" encoding="utf-8"?>
+<p:properties xmlns:p="http://schemas.microsoft.com/office/2006/metadata/properties" xmlns:xsi="http://www.w3.org/2001/XMLSchema-instance" xmlns:pc="http://schemas.microsoft.com/office/infopath/2007/PartnerControls">
+  <documentManagement/>
+</p:properties>
+</file>
+
+<file path=customXml/item3.xml><?xml version="1.0" encoding="utf-8"?>
+<?mso-contentType ?>
+<FormTemplates xmlns="http://schemas.microsoft.com/sharepoint/v3/contenttype/forms">
+  <Display>DocumentLibraryForm</Display>
+  <Edit>DocumentLibraryForm</Edit>
+  <New>DocumentLibraryForm</New>
+</FormTemplates>
+</file>
+
 <file path=customXml/itemProps1.xml><?xml version="1.0" encoding="utf-8"?>
-<ds:datastoreItem xmlns:ds="http://schemas.openxmlformats.org/officeDocument/2006/customXml" ds:itemID="{B973C2A3-9EDC-4F1F-A593-C7085EDC8D75}">
+<ds:datastoreItem xmlns:ds="http://schemas.openxmlformats.org/officeDocument/2006/customXml" ds:itemID="{0325C678-9F60-4BBB-8E49-175DE9417AD1}">
   <ds:schemaRefs>
-    <ds:schemaRef ds:uri="http://schemas.microsoft.com/sharepoint/v3/contenttype/forms"/>
+    <ds:schemaRef ds:uri="23ba0ab6-0247-450b-9319-52df7f9e0b72"/>
+    <ds:schemaRef ds:uri="http://purl.org/dc/elements/1.1/"/>
+    <ds:schemaRef ds:uri="http://purl.org/dc/terms/"/>
+    <ds:schemaRef ds:uri="http://schemas.microsoft.com/internal/obd"/>
+    <ds:schemaRef ds:uri="http://schemas.microsoft.com/office/2006/documentManagement/types"/>
+    <ds:schemaRef ds:uri="http://schemas.microsoft.com/office/2006/metadata/contentType"/>
+    <ds:schemaRef ds:uri="http://schemas.microsoft.com/office/2006/metadata/properties"/>
+    <ds:schemaRef ds:uri="http://schemas.microsoft.com/office/2006/metadata/properties/metaAttributes"/>
+    <ds:schemaRef ds:uri="http://schemas.microsoft.com/office/infopath/2007/PartnerControls"/>
+    <ds:schemaRef ds:uri="http://schemas.openxmlformats.org/package/2006/metadata/core-properties"/>
+    <ds:schemaRef ds:uri="http://www.w3.org/2001/XMLSchema"/>
   </ds:schemaRefs>
 </ds:datastoreItem>
 </file>
@@ -10927,19 +11086,9 @@
 </file>
 
 <file path=customXml/itemProps3.xml><?xml version="1.0" encoding="utf-8"?>
-<ds:datastoreItem xmlns:ds="http://schemas.openxmlformats.org/officeDocument/2006/customXml" ds:itemID="{0325C678-9F60-4BBB-8E49-175DE9417AD1}">
+<ds:datastoreItem xmlns:ds="http://schemas.openxmlformats.org/officeDocument/2006/customXml" ds:itemID="{B973C2A3-9EDC-4F1F-A593-C7085EDC8D75}">
   <ds:schemaRefs>
-    <ds:schemaRef ds:uri="23ba0ab6-0247-450b-9319-52df7f9e0b72"/>
-    <ds:schemaRef ds:uri="http://purl.org/dc/elements/1.1/"/>
-    <ds:schemaRef ds:uri="http://purl.org/dc/terms/"/>
-    <ds:schemaRef ds:uri="http://schemas.microsoft.com/internal/obd"/>
-    <ds:schemaRef ds:uri="http://schemas.microsoft.com/office/2006/documentManagement/types"/>
-    <ds:schemaRef ds:uri="http://schemas.microsoft.com/office/2006/metadata/contentType"/>
-    <ds:schemaRef ds:uri="http://schemas.microsoft.com/office/2006/metadata/properties"/>
-    <ds:schemaRef ds:uri="http://schemas.microsoft.com/office/2006/metadata/properties/metaAttributes"/>
-    <ds:schemaRef ds:uri="http://schemas.microsoft.com/office/infopath/2007/PartnerControls"/>
-    <ds:schemaRef ds:uri="http://schemas.openxmlformats.org/package/2006/metadata/core-properties"/>
-    <ds:schemaRef ds:uri="http://www.w3.org/2001/XMLSchema"/>
+    <ds:schemaRef ds:uri="http://schemas.microsoft.com/sharepoint/v3/contenttype/forms"/>
   </ds:schemaRefs>
 </ds:datastoreItem>
 </file>
</xml_diff>